<commit_message>
adding vedio in powerpoint file
</commit_message>
<xml_diff>
--- a/Documentation/Slide deck intro.pptx
+++ b/Documentation/Slide deck intro.pptx
@@ -3444,8 +3444,20 @@
                 <a:latin typeface="+mj-lt"/>
                 <a:ea typeface="+mj-ea"/>
                 <a:cs typeface="+mj-cs"/>
+                <a:hlinkClick r:id="rId2" action="ppaction://hlinkfile"/>
               </a:rPr>
-              <a:t>Assignment 2:</a:t>
+              <a:t>Assignment 2</a:t>
+            </a:r>
+            <a:r>
+              <a:rPr lang="en-US" sz="3800" b="1" i="0" kern="1200" cap="all" baseline="0" dirty="0">
+                <a:solidFill>
+                  <a:schemeClr val="bg1"/>
+                </a:solidFill>
+                <a:latin typeface="+mj-lt"/>
+                <a:ea typeface="+mj-ea"/>
+                <a:cs typeface="+mj-cs"/>
+              </a:rPr>
+              <a:t>:</a:t>
             </a:r>
           </a:p>
           <a:p>
@@ -3554,7 +3566,7 @@
           <p:nvPr/>
         </p:nvPicPr>
         <p:blipFill rotWithShape="1">
-          <a:blip r:embed="rId2">
+          <a:blip r:embed="rId3">
             <a:extLst>
               <a:ext uri="{28A0092B-C50C-407E-A947-70E740481C1C}">
                 <a14:useLocalDpi xmlns:a14="http://schemas.microsoft.com/office/drawing/2010/main" val="0"/>
@@ -3589,7 +3601,7 @@
           <p:nvPr/>
         </p:nvPicPr>
         <p:blipFill rotWithShape="1">
-          <a:blip r:embed="rId3"/>
+          <a:blip r:embed="rId4"/>
           <a:srcRect t="24927" r="-1" b="13526"/>
           <a:stretch/>
         </p:blipFill>

</xml_diff>